<commit_message>
The one that was printed
</commit_message>
<xml_diff>
--- a/project/ADA Presentation.pptx
+++ b/project/ADA Presentation.pptx
@@ -267,7 +267,7 @@
             <a:fld id="{0158C5BC-9A70-462C-B28D-9600239EAC64}" type="datetimeFigureOut">
               <a:rPr lang="en-US" smtClean="0"/>
               <a:pPr/>
-              <a:t>1/24/2018</a:t>
+              <a:t>1/25/2018</a:t>
             </a:fld>
             <a:endParaRPr lang="en-US"/>
           </a:p>
@@ -434,7 +434,7 @@
             <a:fld id="{E6CC2317-6751-4CD4-9995-8782DD78E936}" type="datetimeFigureOut">
               <a:rPr lang="en-US" smtClean="0"/>
               <a:pPr/>
-              <a:t>1/24/2018</a:t>
+              <a:t>1/25/2018</a:t>
             </a:fld>
             <a:endParaRPr lang="en-US" dirty="0"/>
           </a:p>
@@ -703,6 +703,91 @@
     </a:lvl9pPr>
   </p:notesStyle>
 </p:notesMaster>
+</file>
+
+<file path=ppt/notesSlides/notesSlide1.xml><?xml version="1.0" encoding="utf-8"?>
+<p:notes xmlns:a="http://schemas.openxmlformats.org/drawingml/2006/main" xmlns:r="http://schemas.openxmlformats.org/officeDocument/2006/relationships" xmlns:p="http://schemas.openxmlformats.org/presentationml/2006/main">
+  <p:cSld>
+    <p:spTree>
+      <p:nvGrpSpPr>
+        <p:cNvPr id="1" name=""/>
+        <p:cNvGrpSpPr/>
+        <p:nvPr/>
+      </p:nvGrpSpPr>
+      <p:grpSpPr>
+        <a:xfrm>
+          <a:off x="0" y="0"/>
+          <a:ext cx="0" cy="0"/>
+          <a:chOff x="0" y="0"/>
+          <a:chExt cx="0" cy="0"/>
+        </a:xfrm>
+      </p:grpSpPr>
+      <p:sp>
+        <p:nvSpPr>
+          <p:cNvPr id="2" name="Slide Image Placeholder 1"/>
+          <p:cNvSpPr>
+            <a:spLocks noGrp="1" noRot="1" noChangeAspect="1"/>
+          </p:cNvSpPr>
+          <p:nvPr>
+            <p:ph type="sldImg"/>
+          </p:nvPr>
+        </p:nvSpPr>
+        <p:spPr/>
+      </p:sp>
+      <p:sp>
+        <p:nvSpPr>
+          <p:cNvPr id="3" name="Notes Placeholder 2"/>
+          <p:cNvSpPr>
+            <a:spLocks noGrp="1"/>
+          </p:cNvSpPr>
+          <p:nvPr>
+            <p:ph type="body" idx="1"/>
+          </p:nvPr>
+        </p:nvSpPr>
+        <p:spPr/>
+        <p:txBody>
+          <a:bodyPr/>
+          <a:lstStyle/>
+          <a:p>
+            <a:endParaRPr lang="en-US" dirty="0"/>
+          </a:p>
+        </p:txBody>
+      </p:sp>
+      <p:sp>
+        <p:nvSpPr>
+          <p:cNvPr id="4" name="Slide Number Placeholder 3"/>
+          <p:cNvSpPr>
+            <a:spLocks noGrp="1"/>
+          </p:cNvSpPr>
+          <p:nvPr>
+            <p:ph type="sldNum" sz="quarter" idx="10"/>
+          </p:nvPr>
+        </p:nvSpPr>
+        <p:spPr/>
+        <p:txBody>
+          <a:bodyPr/>
+          <a:lstStyle/>
+          <a:p>
+            <a:fld id="{26A1A87D-CAF7-4BDC-A0D3-C0DBEDE81619}" type="slidenum">
+              <a:rPr lang="en-US" smtClean="0"/>
+              <a:pPr/>
+              <a:t>1</a:t>
+            </a:fld>
+            <a:endParaRPr lang="en-US" dirty="0"/>
+          </a:p>
+        </p:txBody>
+      </p:sp>
+    </p:spTree>
+    <p:extLst>
+      <p:ext uri="{BB962C8B-B14F-4D97-AF65-F5344CB8AC3E}">
+        <p14:creationId xmlns:p14="http://schemas.microsoft.com/office/powerpoint/2010/main" val="3935331795"/>
+      </p:ext>
+    </p:extLst>
+  </p:cSld>
+  <p:clrMapOvr>
+    <a:masterClrMapping/>
+  </p:clrMapOvr>
+</p:notes>
 </file>
 
 <file path=ppt/slideLayouts/slideLayout1.xml><?xml version="1.0" encoding="utf-8"?>
@@ -5213,7 +5298,7 @@
               <a:graphicData uri="http://schemas.openxmlformats.org/presentationml/2006/ole">
                 <mc:AlternateContent xmlns:mc="http://schemas.openxmlformats.org/markup-compatibility/2006">
                   <mc:Choice xmlns:v="urn:schemas-microsoft-com:vml" Requires="v">
-                    <p:oleObj spid="_x0000_s1627" name="Image" r:id="rId8" imgW="1828440" imgH="1117440" progId="Photoshop.Image.13">
+                    <p:oleObj spid="_x0000_s1639" name="Image" r:id="rId8" imgW="1828440" imgH="1117440" progId="Photoshop.Image.13">
                       <p:embed/>
                     </p:oleObj>
                   </mc:Choice>
@@ -5270,7 +5355,7 @@
               <a:graphicData uri="http://schemas.openxmlformats.org/presentationml/2006/ole">
                 <mc:AlternateContent xmlns:mc="http://schemas.openxmlformats.org/markup-compatibility/2006">
                   <mc:Choice xmlns:v="urn:schemas-microsoft-com:vml" Requires="v">
-                    <p:oleObj spid="_x0000_s1628" name="Image" r:id="rId10" imgW="1828440" imgH="1117440" progId="Photoshop.Image.13">
+                    <p:oleObj spid="_x0000_s1640" name="Image" r:id="rId10" imgW="1828440" imgH="1117440" progId="Photoshop.Image.13">
                       <p:embed/>
                     </p:oleObj>
                   </mc:Choice>
@@ -6398,7 +6483,7 @@
             <a:graphicData uri="http://schemas.openxmlformats.org/presentationml/2006/ole">
               <mc:AlternateContent xmlns:mc="http://schemas.openxmlformats.org/markup-compatibility/2006">
                 <mc:Choice xmlns:v="urn:schemas-microsoft-com:vml" Requires="v">
-                  <p:oleObj spid="_x0000_s1629" name="Image" r:id="rId12" imgW="4571280" imgH="1688760" progId="Photoshop.Image.13">
+                  <p:oleObj spid="_x0000_s1641" name="Image" r:id="rId12" imgW="4571280" imgH="1688760" progId="Photoshop.Image.13">
                     <p:embed/>
                   </p:oleObj>
                 </mc:Choice>
@@ -6482,7 +6567,7 @@
             <a:graphicData uri="http://schemas.openxmlformats.org/presentationml/2006/ole">
               <mc:AlternateContent xmlns:mc="http://schemas.openxmlformats.org/markup-compatibility/2006">
                 <mc:Choice xmlns:v="urn:schemas-microsoft-com:vml" Requires="v">
-                  <p:oleObj spid="_x0000_s1630" name="Image" r:id="rId15" imgW="1574280" imgH="1053720" progId="Photoshop.Image.13">
+                  <p:oleObj spid="_x0000_s1642" name="Image" r:id="rId15" imgW="1574280" imgH="1053720" progId="Photoshop.Image.13">
                     <p:embed/>
                   </p:oleObj>
                 </mc:Choice>
@@ -8372,7 +8457,7 @@
             <a:graphicData uri="http://schemas.openxmlformats.org/presentationml/2006/ole">
               <mc:AlternateContent xmlns:mc="http://schemas.openxmlformats.org/markup-compatibility/2006">
                 <mc:Choice xmlns:v="urn:schemas-microsoft-com:vml" Requires="v">
-                  <p:oleObj spid="_x0000_s2203" name="Image" r:id="rId4" imgW="4571280" imgH="1688760" progId="Photoshop.Image.13">
+                  <p:oleObj spid="_x0000_s2215" name="Image" r:id="rId4" imgW="4571280" imgH="1688760" progId="Photoshop.Image.13">
                     <p:embed/>
                   </p:oleObj>
                 </mc:Choice>
@@ -8456,7 +8541,7 @@
             <a:graphicData uri="http://schemas.openxmlformats.org/presentationml/2006/ole">
               <mc:AlternateContent xmlns:mc="http://schemas.openxmlformats.org/markup-compatibility/2006">
                 <mc:Choice xmlns:v="urn:schemas-microsoft-com:vml" Requires="v">
-                  <p:oleObj spid="_x0000_s2204" name="Image" r:id="rId7" imgW="1574280" imgH="1053720" progId="Photoshop.Image.13">
+                  <p:oleObj spid="_x0000_s2216" name="Image" r:id="rId7" imgW="1574280" imgH="1053720" progId="Photoshop.Image.13">
                     <p:embed/>
                   </p:oleObj>
                 </mc:Choice>
@@ -9852,7 +9937,7 @@
               <a:graphicData uri="http://schemas.openxmlformats.org/presentationml/2006/ole">
                 <mc:AlternateContent xmlns:mc="http://schemas.openxmlformats.org/markup-compatibility/2006">
                   <mc:Choice xmlns:v="urn:schemas-microsoft-com:vml" Requires="v">
-                    <p:oleObj spid="_x0000_s2205" name="Image" r:id="rId15" imgW="1828440" imgH="1117440" progId="Photoshop.Image.13">
+                    <p:oleObj spid="_x0000_s2217" name="Image" r:id="rId15" imgW="1828440" imgH="1117440" progId="Photoshop.Image.13">
                       <p:embed/>
                     </p:oleObj>
                   </mc:Choice>
@@ -9909,7 +9994,7 @@
               <a:graphicData uri="http://schemas.openxmlformats.org/presentationml/2006/ole">
                 <mc:AlternateContent xmlns:mc="http://schemas.openxmlformats.org/markup-compatibility/2006">
                   <mc:Choice xmlns:v="urn:schemas-microsoft-com:vml" Requires="v">
-                    <p:oleObj spid="_x0000_s2206" name="Image" r:id="rId17" imgW="1828440" imgH="1117440" progId="Photoshop.Image.13">
+                    <p:oleObj spid="_x0000_s2218" name="Image" r:id="rId17" imgW="1828440" imgH="1117440" progId="Photoshop.Image.13">
                       <p:embed/>
                     </p:oleObj>
                   </mc:Choice>
@@ -11845,7 +11930,7 @@
             <a:graphicData uri="http://schemas.openxmlformats.org/presentationml/2006/ole">
               <mc:AlternateContent xmlns:mc="http://schemas.openxmlformats.org/markup-compatibility/2006">
                 <mc:Choice xmlns:v="urn:schemas-microsoft-com:vml" Requires="v">
-                  <p:oleObj spid="_x0000_s3223" name="Image" r:id="rId4" imgW="4571280" imgH="1688760" progId="Photoshop.Image.13">
+                  <p:oleObj spid="_x0000_s3235" name="Image" r:id="rId4" imgW="4571280" imgH="1688760" progId="Photoshop.Image.13">
                     <p:embed/>
                   </p:oleObj>
                 </mc:Choice>
@@ -11929,7 +12014,7 @@
             <a:graphicData uri="http://schemas.openxmlformats.org/presentationml/2006/ole">
               <mc:AlternateContent xmlns:mc="http://schemas.openxmlformats.org/markup-compatibility/2006">
                 <mc:Choice xmlns:v="urn:schemas-microsoft-com:vml" Requires="v">
-                  <p:oleObj spid="_x0000_s3224" name="Image" r:id="rId7" imgW="1574280" imgH="1053720" progId="Photoshop.Image.13">
+                  <p:oleObj spid="_x0000_s3236" name="Image" r:id="rId7" imgW="1574280" imgH="1053720" progId="Photoshop.Image.13">
                     <p:embed/>
                   </p:oleObj>
                 </mc:Choice>
@@ -13325,7 +13410,7 @@
               <a:graphicData uri="http://schemas.openxmlformats.org/presentationml/2006/ole">
                 <mc:AlternateContent xmlns:mc="http://schemas.openxmlformats.org/markup-compatibility/2006">
                   <mc:Choice xmlns:v="urn:schemas-microsoft-com:vml" Requires="v">
-                    <p:oleObj spid="_x0000_s3225" name="Image" r:id="rId15" imgW="1828440" imgH="1117440" progId="Photoshop.Image.13">
+                    <p:oleObj spid="_x0000_s3237" name="Image" r:id="rId15" imgW="1828440" imgH="1117440" progId="Photoshop.Image.13">
                       <p:embed/>
                     </p:oleObj>
                   </mc:Choice>
@@ -13382,7 +13467,7 @@
               <a:graphicData uri="http://schemas.openxmlformats.org/presentationml/2006/ole">
                 <mc:AlternateContent xmlns:mc="http://schemas.openxmlformats.org/markup-compatibility/2006">
                   <mc:Choice xmlns:v="urn:schemas-microsoft-com:vml" Requires="v">
-                    <p:oleObj spid="_x0000_s3226" name="Image" r:id="rId17" imgW="1828440" imgH="1117440" progId="Photoshop.Image.13">
+                    <p:oleObj spid="_x0000_s3238" name="Image" r:id="rId17" imgW="1828440" imgH="1117440" progId="Photoshop.Image.13">
                       <p:embed/>
                     </p:oleObj>
                   </mc:Choice>
@@ -14815,7 +14900,7 @@
                 <a:ext cx="10058400" cy="8681265"/>
               </a:xfrm>
               <a:blipFill rotWithShape="0">
-                <a:blip r:embed="rId2"/>
+                <a:blip r:embed="rId3"/>
                 <a:stretch>
                   <a:fillRect l="-182"/>
                 </a:stretch>
@@ -15211,7 +15296,7 @@
                 <a:ext cx="20720048" cy="2917380"/>
               </a:xfrm>
               <a:blipFill rotWithShape="0">
-                <a:blip r:embed="rId3"/>
+                <a:blip r:embed="rId4"/>
                 <a:stretch>
                   <a:fillRect l="-235"/>
                 </a:stretch>
@@ -15355,7 +15440,7 @@
           <p:nvPr/>
         </p:nvPicPr>
         <p:blipFill>
-          <a:blip r:embed="rId4" cstate="print">
+          <a:blip r:embed="rId5" cstate="print">
             <a:extLst>
               <a:ext uri="{28A0092B-C50C-407E-A947-70E740481C1C}">
                 <a14:useLocalDpi xmlns:a14="http://schemas.microsoft.com/office/drawing/2010/main" val="0"/>
@@ -15385,7 +15470,7 @@
           <p:nvPr/>
         </p:nvPicPr>
         <p:blipFill>
-          <a:blip r:embed="rId5" cstate="print">
+          <a:blip r:embed="rId6" cstate="print">
             <a:extLst>
               <a:ext uri="{28A0092B-C50C-407E-A947-70E740481C1C}">
                 <a14:useLocalDpi xmlns:a14="http://schemas.microsoft.com/office/drawing/2010/main" val="0"/>
@@ -15414,14 +15499,14 @@
         </p:nvSpPr>
         <p:spPr>
           <a:xfrm>
-            <a:off x="13957804" y="15069205"/>
+            <a:off x="13957804" y="13778779"/>
             <a:ext cx="16459200" cy="16459200"/>
           </a:xfrm>
           <a:prstGeom prst="ellipse">
             <a:avLst/>
           </a:prstGeom>
           <a:blipFill>
-            <a:blip r:embed="rId6"/>
+            <a:blip r:embed="rId7"/>
             <a:stretch>
               <a:fillRect/>
             </a:stretch>
@@ -15475,14 +15560,14 @@
         </p:nvSpPr>
         <p:spPr>
           <a:xfrm>
-            <a:off x="12176200" y="13405717"/>
+            <a:off x="12027908" y="12751720"/>
             <a:ext cx="3291840" cy="3291840"/>
           </a:xfrm>
           <a:prstGeom prst="ellipse">
             <a:avLst/>
           </a:prstGeom>
           <a:blipFill>
-            <a:blip r:embed="rId7"/>
+            <a:blip r:embed="rId8"/>
             <a:stretch>
               <a:fillRect/>
             </a:stretch>
@@ -15530,7 +15615,7 @@
           <p:nvPr/>
         </p:nvPicPr>
         <p:blipFill>
-          <a:blip r:embed="rId8">
+          <a:blip r:embed="rId9">
             <a:extLst>
               <a:ext uri="{28A0092B-C50C-407E-A947-70E740481C1C}">
                 <a14:useLocalDpi xmlns:a14="http://schemas.microsoft.com/office/drawing/2010/main" val="0"/>
@@ -15542,8 +15627,8 @@
           </a:stretch>
         </p:blipFill>
         <p:spPr>
-          <a:xfrm rot="2124557">
-            <a:off x="23593707" y="15535797"/>
+          <a:xfrm>
+            <a:off x="22458506" y="31241945"/>
             <a:ext cx="8778016" cy="991353"/>
           </a:xfrm>
           <a:prstGeom prst="rect">
@@ -15560,7 +15645,7 @@
           <p:nvPr/>
         </p:nvPicPr>
         <p:blipFill rotWithShape="1">
-          <a:blip r:embed="rId9"/>
+          <a:blip r:embed="rId10"/>
           <a:srcRect l="1" t="11354" r="6259" b="1016"/>
           <a:stretch/>
         </p:blipFill>
@@ -15582,7 +15667,7 @@
         </p:nvCxnSpPr>
         <p:spPr>
           <a:xfrm flipV="1">
-            <a:off x="2855300" y="26471977"/>
+            <a:off x="2855300" y="26071927"/>
             <a:ext cx="0" cy="1613847"/>
           </a:xfrm>
           <a:prstGeom prst="straightConnector1">
@@ -15618,7 +15703,7 @@
         </p:nvCxnSpPr>
         <p:spPr>
           <a:xfrm flipV="1">
-            <a:off x="8570300" y="27343805"/>
+            <a:off x="8570300" y="26915180"/>
             <a:ext cx="0" cy="1613847"/>
           </a:xfrm>
           <a:prstGeom prst="straightConnector1">
@@ -15722,7 +15807,7 @@
         </p:nvSpPr>
         <p:spPr>
           <a:xfrm>
-            <a:off x="14886479" y="31750573"/>
+            <a:off x="9895379" y="31750573"/>
             <a:ext cx="14601849" cy="523220"/>
           </a:xfrm>
           <a:prstGeom prst="rect">
@@ -15829,7 +15914,7 @@
         <p:spPr>
           <a:xfrm>
             <a:off x="32682280" y="26333098"/>
-            <a:ext cx="10410989" cy="2923855"/>
+            <a:ext cx="10410989" cy="3514786"/>
           </a:xfrm>
         </p:spPr>
         <p:txBody>
@@ -15854,6 +15939,8 @@
               </a:rPr>
               <a:t> metric which uses the Wikipedia and Events correlation for classification, to be the best among the three, as it was the most consistent and had the least flagrant misclassifications. </a:t>
             </a:r>
+          </a:p>
+          <a:p>
             <a:endParaRPr lang="en-US" sz="3200" dirty="0">
               <a:latin typeface="+mn-lt"/>
             </a:endParaRPr>
@@ -15869,11 +15956,11 @@
           <p:nvPr/>
         </p:nvPicPr>
         <p:blipFill rotWithShape="1">
-          <a:blip r:embed="rId10">
+          <a:blip r:embed="rId11">
             <a:extLst>
               <a:ext uri="{BEBA8EAE-BF5A-486C-A8C5-ECC9F3942E4B}">
                 <a14:imgProps xmlns:a14="http://schemas.microsoft.com/office/drawing/2010/main">
-                  <a14:imgLayer r:embed="rId11">
+                  <a14:imgLayer r:embed="rId12">
                     <a14:imgEffect>
                       <a14:artisticTexturizer/>
                     </a14:imgEffect>
@@ -15911,11 +15998,11 @@
           <p:nvPr/>
         </p:nvPicPr>
         <p:blipFill rotWithShape="1">
-          <a:blip r:embed="rId10">
+          <a:blip r:embed="rId11">
             <a:extLst>
               <a:ext uri="{BEBA8EAE-BF5A-486C-A8C5-ECC9F3942E4B}">
                 <a14:imgProps xmlns:a14="http://schemas.microsoft.com/office/drawing/2010/main">
-                  <a14:imgLayer r:embed="rId11">
+                  <a14:imgLayer r:embed="rId12">
                     <a14:imgEffect>
                       <a14:artisticTexturizer/>
                     </a14:imgEffect>
@@ -15953,11 +16040,11 @@
           <p:nvPr/>
         </p:nvPicPr>
         <p:blipFill rotWithShape="1">
-          <a:blip r:embed="rId10">
+          <a:blip r:embed="rId11">
             <a:extLst>
               <a:ext uri="{BEBA8EAE-BF5A-486C-A8C5-ECC9F3942E4B}">
                 <a14:imgProps xmlns:a14="http://schemas.microsoft.com/office/drawing/2010/main">
-                  <a14:imgLayer r:embed="rId11">
+                  <a14:imgLayer r:embed="rId12">
                     <a14:imgEffect>
                       <a14:artisticTexturizer/>
                     </a14:imgEffect>
@@ -16506,7 +16593,7 @@
                 <a:ext cx="20720048" cy="3182387"/>
               </a:xfrm>
               <a:blipFill rotWithShape="0">
-                <a:blip r:embed="rId12"/>
+                <a:blip r:embed="rId13"/>
                 <a:stretch>
                   <a:fillRect l="-235"/>
                 </a:stretch>
@@ -16536,7 +16623,7 @@
           <p:nvPr/>
         </p:nvPicPr>
         <p:blipFill>
-          <a:blip r:embed="rId13">
+          <a:blip r:embed="rId14">
             <a:extLst>
               <a:ext uri="{28A0092B-C50C-407E-A947-70E740481C1C}">
                 <a14:useLocalDpi xmlns:a14="http://schemas.microsoft.com/office/drawing/2010/main" val="0"/>
@@ -16549,7 +16636,7 @@
         </p:blipFill>
         <p:spPr>
           <a:xfrm>
-            <a:off x="41007323" y="29941179"/>
+            <a:off x="41092145" y="30034523"/>
             <a:ext cx="2883877" cy="2883877"/>
           </a:xfrm>
           <a:prstGeom prst="rect">
@@ -16557,6 +16644,44 @@
           </a:prstGeom>
         </p:spPr>
       </p:pic>
+      <p:sp>
+        <p:nvSpPr>
+          <p:cNvPr id="4" name="Text Placeholder 3"/>
+          <p:cNvSpPr>
+            <a:spLocks noGrp="1"/>
+          </p:cNvSpPr>
+          <p:nvPr>
+            <p:ph type="body" sz="quarter" idx="10"/>
+          </p:nvPr>
+        </p:nvSpPr>
+        <p:spPr/>
+        <p:txBody>
+          <a:bodyPr/>
+          <a:lstStyle/>
+          <a:p>
+            <a:endParaRPr lang="en-US"/>
+          </a:p>
+        </p:txBody>
+      </p:sp>
+      <p:sp>
+        <p:nvSpPr>
+          <p:cNvPr id="6" name="Text Placeholder 5"/>
+          <p:cNvSpPr>
+            <a:spLocks noGrp="1"/>
+          </p:cNvSpPr>
+          <p:nvPr>
+            <p:ph type="body" sz="quarter" idx="20"/>
+          </p:nvPr>
+        </p:nvSpPr>
+        <p:spPr/>
+        <p:txBody>
+          <a:bodyPr/>
+          <a:lstStyle/>
+          <a:p>
+            <a:endParaRPr lang="en-US"/>
+          </a:p>
+        </p:txBody>
+      </p:sp>
     </p:spTree>
     <p:extLst>
       <p:ext uri="{BB962C8B-B14F-4D97-AF65-F5344CB8AC3E}">

</xml_diff>